<commit_message>
Adicionadas Aulas iniciais Java
</commit_message>
<xml_diff>
--- a/POO/Aulas/PPT/Aula #11 - Estruturas de Dados.pptx
+++ b/POO/Aulas/PPT/Aula #11 - Estruturas de Dados.pptx
@@ -397,7 +397,7 @@
             <a:fld id="{1D8BD707-D9CF-40AE-B4C6-C98DA3205C09}" type="datetimeFigureOut">
               <a:rPr lang="en-US" smtClean="0"/>
               <a:pPr/>
-              <a:t>1/25/2023</a:t>
+              <a:t>2/27/2023</a:t>
             </a:fld>
             <a:endParaRPr lang="en-US"/>
           </a:p>
@@ -562,7 +562,7 @@
             <a:fld id="{1D8BD707-D9CF-40AE-B4C6-C98DA3205C09}" type="datetimeFigureOut">
               <a:rPr lang="en-US" smtClean="0"/>
               <a:pPr/>
-              <a:t>1/25/2023</a:t>
+              <a:t>2/27/2023</a:t>
             </a:fld>
             <a:endParaRPr lang="en-US"/>
           </a:p>
@@ -737,7 +737,7 @@
             <a:fld id="{1D8BD707-D9CF-40AE-B4C6-C98DA3205C09}" type="datetimeFigureOut">
               <a:rPr lang="en-US" smtClean="0"/>
               <a:pPr/>
-              <a:t>1/25/2023</a:t>
+              <a:t>2/27/2023</a:t>
             </a:fld>
             <a:endParaRPr lang="en-US"/>
           </a:p>
@@ -902,7 +902,7 @@
             <a:fld id="{1D8BD707-D9CF-40AE-B4C6-C98DA3205C09}" type="datetimeFigureOut">
               <a:rPr lang="en-US" smtClean="0"/>
               <a:pPr/>
-              <a:t>1/25/2023</a:t>
+              <a:t>2/27/2023</a:t>
             </a:fld>
             <a:endParaRPr lang="en-US"/>
           </a:p>
@@ -1144,7 +1144,7 @@
             <a:fld id="{1D8BD707-D9CF-40AE-B4C6-C98DA3205C09}" type="datetimeFigureOut">
               <a:rPr lang="en-US" smtClean="0"/>
               <a:pPr/>
-              <a:t>1/25/2023</a:t>
+              <a:t>2/27/2023</a:t>
             </a:fld>
             <a:endParaRPr lang="en-US"/>
           </a:p>
@@ -1426,7 +1426,7 @@
             <a:fld id="{1D8BD707-D9CF-40AE-B4C6-C98DA3205C09}" type="datetimeFigureOut">
               <a:rPr lang="en-US" smtClean="0"/>
               <a:pPr/>
-              <a:t>1/25/2023</a:t>
+              <a:t>2/27/2023</a:t>
             </a:fld>
             <a:endParaRPr lang="en-US"/>
           </a:p>
@@ -1842,7 +1842,7 @@
             <a:fld id="{1D8BD707-D9CF-40AE-B4C6-C98DA3205C09}" type="datetimeFigureOut">
               <a:rPr lang="en-US" smtClean="0"/>
               <a:pPr/>
-              <a:t>1/25/2023</a:t>
+              <a:t>2/27/2023</a:t>
             </a:fld>
             <a:endParaRPr lang="en-US"/>
           </a:p>
@@ -1956,7 +1956,7 @@
             <a:fld id="{1D8BD707-D9CF-40AE-B4C6-C98DA3205C09}" type="datetimeFigureOut">
               <a:rPr lang="en-US" smtClean="0"/>
               <a:pPr/>
-              <a:t>1/25/2023</a:t>
+              <a:t>2/27/2023</a:t>
             </a:fld>
             <a:endParaRPr lang="en-US"/>
           </a:p>
@@ -2048,7 +2048,7 @@
             <a:fld id="{1D8BD707-D9CF-40AE-B4C6-C98DA3205C09}" type="datetimeFigureOut">
               <a:rPr lang="en-US" smtClean="0"/>
               <a:pPr/>
-              <a:t>1/25/2023</a:t>
+              <a:t>2/27/2023</a:t>
             </a:fld>
             <a:endParaRPr lang="en-US"/>
           </a:p>
@@ -2320,7 +2320,7 @@
             <a:fld id="{1D8BD707-D9CF-40AE-B4C6-C98DA3205C09}" type="datetimeFigureOut">
               <a:rPr lang="en-US" smtClean="0"/>
               <a:pPr/>
-              <a:t>1/25/2023</a:t>
+              <a:t>2/27/2023</a:t>
             </a:fld>
             <a:endParaRPr lang="en-US"/>
           </a:p>
@@ -2569,7 +2569,7 @@
             <a:fld id="{1D8BD707-D9CF-40AE-B4C6-C98DA3205C09}" type="datetimeFigureOut">
               <a:rPr lang="en-US" smtClean="0"/>
               <a:pPr/>
-              <a:t>1/25/2023</a:t>
+              <a:t>2/27/2023</a:t>
             </a:fld>
             <a:endParaRPr lang="en-US"/>
           </a:p>
@@ -2777,7 +2777,7 @@
             <a:fld id="{1D8BD707-D9CF-40AE-B4C6-C98DA3205C09}" type="datetimeFigureOut">
               <a:rPr lang="en-US" smtClean="0"/>
               <a:pPr/>
-              <a:t>1/25/2023</a:t>
+              <a:t>2/27/2023</a:t>
             </a:fld>
             <a:endParaRPr lang="en-US"/>
           </a:p>
@@ -23745,7 +23745,7 @@
                 </a:lnSpc>
               </a:pPr>
               <a:r>
-                <a:rPr lang="en-US" sz="2271">
+                <a:rPr lang="en-US" sz="2271" dirty="0" err="1">
                   <a:solidFill>
                     <a:srgbClr val="000000"/>
                   </a:solidFill>
@@ -23753,6 +23753,12 @@
                 </a:rPr>
                 <a:t>vector.verifyLength</a:t>
               </a:r>
+              <a:endParaRPr lang="en-US" sz="2271" dirty="0">
+                <a:solidFill>
+                  <a:srgbClr val="000000"/>
+                </a:solidFill>
+                <a:latin typeface="Montserrat"/>
+              </a:endParaRPr>
             </a:p>
           </p:txBody>
         </p:sp>
@@ -24452,10 +24458,10 @@
         </p:nvGrpSpPr>
         <p:grpSpPr>
           <a:xfrm>
-            <a:off x="4504722" y="3201752"/>
-            <a:ext cx="3272180" cy="1831641"/>
-            <a:chOff x="0" y="0"/>
-            <a:chExt cx="667550" cy="373669"/>
+            <a:off x="4504722" y="2828237"/>
+            <a:ext cx="3272180" cy="2499444"/>
+            <a:chOff x="0" y="-76200"/>
+            <a:chExt cx="667550" cy="509906"/>
           </a:xfrm>
         </p:grpSpPr>
         <p:sp>
@@ -24550,7 +24556,7 @@
           <p:spPr>
             <a:xfrm>
               <a:off x="0" y="-76200"/>
-              <a:ext cx="812800" cy="889000"/>
+              <a:ext cx="667550" cy="509906"/>
             </a:xfrm>
             <a:prstGeom prst="rect">
               <a:avLst/>
@@ -24566,7 +24572,7 @@
                 </a:lnSpc>
               </a:pPr>
               <a:r>
-                <a:rPr lang="en-US" sz="2271">
+                <a:rPr lang="en-US" sz="2271" dirty="0" err="1">
                   <a:solidFill>
                     <a:srgbClr val="000000"/>
                   </a:solidFill>
@@ -24574,6 +24580,12 @@
                 </a:rPr>
                 <a:t>app.ts</a:t>
               </a:r>
+              <a:endParaRPr lang="en-US" sz="2271" dirty="0">
+                <a:solidFill>
+                  <a:srgbClr val="000000"/>
+                </a:solidFill>
+                <a:latin typeface="Montserrat"/>
+              </a:endParaRPr>
             </a:p>
           </p:txBody>
         </p:sp>
@@ -24586,10 +24598,10 @@
         </p:nvGrpSpPr>
         <p:grpSpPr>
           <a:xfrm>
-            <a:off x="4504722" y="5314206"/>
-            <a:ext cx="3272180" cy="1831641"/>
-            <a:chOff x="0" y="0"/>
-            <a:chExt cx="667550" cy="373669"/>
+            <a:off x="4504722" y="4940691"/>
+            <a:ext cx="3272180" cy="2425834"/>
+            <a:chOff x="0" y="-76200"/>
+            <a:chExt cx="667550" cy="494889"/>
           </a:xfrm>
         </p:grpSpPr>
         <p:sp>
@@ -24684,7 +24696,7 @@
           <p:spPr>
             <a:xfrm>
               <a:off x="0" y="-76200"/>
-              <a:ext cx="812800" cy="889000"/>
+              <a:ext cx="662235" cy="494889"/>
             </a:xfrm>
             <a:prstGeom prst="rect">
               <a:avLst/>
@@ -24700,7 +24712,7 @@
                 </a:lnSpc>
               </a:pPr>
               <a:r>
-                <a:rPr lang="en-US" sz="2271">
+                <a:rPr lang="en-US" sz="2271" dirty="0" err="1">
                   <a:solidFill>
                     <a:srgbClr val="000000"/>
                   </a:solidFill>
@@ -24708,6 +24720,12 @@
                 </a:rPr>
                 <a:t>vector.add</a:t>
               </a:r>
+              <a:endParaRPr lang="en-US" sz="2271" dirty="0">
+                <a:solidFill>
+                  <a:srgbClr val="000000"/>
+                </a:solidFill>
+                <a:latin typeface="Montserrat"/>
+              </a:endParaRPr>
             </a:p>
           </p:txBody>
         </p:sp>
@@ -24720,10 +24738,10 @@
         </p:nvGrpSpPr>
         <p:grpSpPr>
           <a:xfrm>
-            <a:off x="4504722" y="7426659"/>
-            <a:ext cx="3272180" cy="1831641"/>
-            <a:chOff x="0" y="0"/>
-            <a:chExt cx="667550" cy="373669"/>
+            <a:off x="4504722" y="7053144"/>
+            <a:ext cx="3272180" cy="2499444"/>
+            <a:chOff x="0" y="-76200"/>
+            <a:chExt cx="667550" cy="509906"/>
           </a:xfrm>
         </p:grpSpPr>
         <p:sp>
@@ -24818,7 +24836,7 @@
           <p:spPr>
             <a:xfrm>
               <a:off x="0" y="-76200"/>
-              <a:ext cx="812800" cy="889000"/>
+              <a:ext cx="662235" cy="509906"/>
             </a:xfrm>
             <a:prstGeom prst="rect">
               <a:avLst/>
@@ -24834,7 +24852,7 @@
                 </a:lnSpc>
               </a:pPr>
               <a:r>
-                <a:rPr lang="en-US" sz="2271">
+                <a:rPr lang="en-US" sz="2271" dirty="0" err="1">
                   <a:solidFill>
                     <a:srgbClr val="000000"/>
                   </a:solidFill>
@@ -24842,6 +24860,12 @@
                 </a:rPr>
                 <a:t>vector.verifyLength</a:t>
               </a:r>
+              <a:endParaRPr lang="en-US" sz="2271" dirty="0">
+                <a:solidFill>
+                  <a:srgbClr val="000000"/>
+                </a:solidFill>
+                <a:latin typeface="Montserrat"/>
+              </a:endParaRPr>
             </a:p>
           </p:txBody>
         </p:sp>
@@ -43334,14 +43358,74 @@
                 </a:lnSpc>
               </a:pPr>
               <a:r>
-                <a:rPr lang="en-US" sz="2271">
+                <a:rPr lang="en-US" sz="2271" dirty="0" err="1">
                   <a:solidFill>
                     <a:srgbClr val="000000"/>
                   </a:solidFill>
                   <a:latin typeface="Montserrat"/>
                 </a:rPr>
-                <a:t>Retorno do tipo genérico declarado</a:t>
+                <a:t>Retorno</a:t>
               </a:r>
+              <a:r>
+                <a:rPr lang="en-US" sz="2271" dirty="0">
+                  <a:solidFill>
+                    <a:srgbClr val="000000"/>
+                  </a:solidFill>
+                  <a:latin typeface="Montserrat"/>
+                </a:rPr>
+                <a:t> do </a:t>
+              </a:r>
+              <a:r>
+                <a:rPr lang="en-US" sz="2271" dirty="0" err="1">
+                  <a:solidFill>
+                    <a:srgbClr val="000000"/>
+                  </a:solidFill>
+                  <a:latin typeface="Montserrat"/>
+                </a:rPr>
+                <a:t>tipo</a:t>
+              </a:r>
+              <a:r>
+                <a:rPr lang="en-US" sz="2271" dirty="0">
+                  <a:solidFill>
+                    <a:srgbClr val="000000"/>
+                  </a:solidFill>
+                  <a:latin typeface="Montserrat"/>
+                </a:rPr>
+                <a:t> </a:t>
+              </a:r>
+              <a:r>
+                <a:rPr lang="en-US" sz="2271" dirty="0" err="1">
+                  <a:solidFill>
+                    <a:srgbClr val="000000"/>
+                  </a:solidFill>
+                  <a:latin typeface="Montserrat"/>
+                </a:rPr>
+                <a:t>genérico</a:t>
+              </a:r>
+              <a:r>
+                <a:rPr lang="en-US" sz="2271" dirty="0">
+                  <a:solidFill>
+                    <a:srgbClr val="000000"/>
+                  </a:solidFill>
+                  <a:latin typeface="Montserrat"/>
+                </a:rPr>
+                <a:t> </a:t>
+              </a:r>
+              <a:r>
+                <a:rPr lang="en-US" sz="2271" dirty="0" err="1">
+                  <a:solidFill>
+                    <a:srgbClr val="000000"/>
+                  </a:solidFill>
+                  <a:latin typeface="Montserrat"/>
+                </a:rPr>
+                <a:t>declarado</a:t>
+              </a:r>
+              <a:endParaRPr lang="en-US" sz="2271" dirty="0">
+                <a:solidFill>
+                  <a:srgbClr val="000000"/>
+                </a:solidFill>
+                <a:latin typeface="Montserrat"/>
+              </a:endParaRPr>
             </a:p>
           </p:txBody>
         </p:sp>

</xml_diff>